<commit_message>
add join demos - 12
</commit_message>
<xml_diff>
--- a/XII class/DB - Module 3/08.9. MSSQL-Build-In-Functions/Вградени функции в MS SQL.pptx
+++ b/XII class/DB - Module 3/08.9. MSSQL-Build-In-Functions/Вградени функции в MS SQL.pptx
@@ -1223,7 +1223,7 @@
           <a:p>
             <a:fld id="{F4CBB1A1-ABFD-4EB3-8B40-3354BC2AEC6A}" type="datetimeFigureOut">
               <a:rPr lang="en-GB" smtClean="0"/>
-              <a:t>12/11/2024</a:t>
+              <a:t>19/11/2024</a:t>
             </a:fld>
             <a:endParaRPr lang="en-GB"/>
           </a:p>
@@ -1730,7 +1730,7 @@
             <a:fld id="{11A6662E-FAF4-44BC-88B5-85A7CBFB6D30}" type="datetime1">
               <a:rPr lang="en-US" smtClean="0"/>
               <a:pPr/>
-              <a:t>11/12/2024</a:t>
+              <a:t>11/19/2024</a:t>
             </a:fld>
             <a:endParaRPr lang="en-US"/>
           </a:p>
@@ -1941,7 +1941,7 @@
           <a:p>
             <a:fld id="{4C559632-1575-4E14-B53B-3DC3D5ED3947}" type="datetime1">
               <a:rPr lang="en-US" smtClean="0"/>
-              <a:t>11/12/2024</a:t>
+              <a:t>11/19/2024</a:t>
             </a:fld>
             <a:endParaRPr lang="en-US"/>
           </a:p>
@@ -2149,7 +2149,7 @@
           <a:p>
             <a:fld id="{CC4A6868-2568-4CC9-B302-F37117B01A6E}" type="datetime1">
               <a:rPr lang="en-US" smtClean="0"/>
-              <a:t>11/12/2024</a:t>
+              <a:t>11/19/2024</a:t>
             </a:fld>
             <a:endParaRPr lang="en-US"/>
           </a:p>
@@ -2352,7 +2352,7 @@
           <a:p>
             <a:fld id="{0055F08A-1E71-4B2B-BB49-E743F2903911}" type="datetime1">
               <a:rPr lang="en-US" smtClean="0"/>
-              <a:t>11/12/2024</a:t>
+              <a:t>11/19/2024</a:t>
             </a:fld>
             <a:endParaRPr lang="en-US" dirty="0"/>
           </a:p>
@@ -2626,7 +2626,7 @@
           <a:p>
             <a:fld id="{15417D9E-721A-44BB-8863-9873FE64DA75}" type="datetime1">
               <a:rPr lang="en-US" smtClean="0"/>
-              <a:t>11/12/2024</a:t>
+              <a:t>11/19/2024</a:t>
             </a:fld>
             <a:endParaRPr lang="en-US"/>
           </a:p>
@@ -2896,7 +2896,7 @@
           <a:p>
             <a:fld id="{5F31DA2F-80B8-49CF-99FB-5ABCA53A607A}" type="datetime1">
               <a:rPr lang="en-US" smtClean="0"/>
-              <a:t>11/12/2024</a:t>
+              <a:t>11/19/2024</a:t>
             </a:fld>
             <a:endParaRPr lang="en-US"/>
           </a:p>
@@ -3309,7 +3309,7 @@
           <a:p>
             <a:fld id="{28852172-E6C9-4B6C-929A-A9DE3837BBF1}" type="datetime1">
               <a:rPr lang="en-US" smtClean="0"/>
-              <a:t>11/12/2024</a:t>
+              <a:t>11/19/2024</a:t>
             </a:fld>
             <a:endParaRPr lang="en-US"/>
           </a:p>
@@ -3455,7 +3455,7 @@
           <a:p>
             <a:fld id="{3AB41CFF-90C9-47B3-9DA1-F2BF8D839F7E}" type="datetime1">
               <a:rPr lang="en-US" smtClean="0"/>
-              <a:t>11/12/2024</a:t>
+              <a:t>11/19/2024</a:t>
             </a:fld>
             <a:endParaRPr lang="en-US"/>
           </a:p>
@@ -3568,7 +3568,7 @@
           <a:p>
             <a:fld id="{F06048FA-06AB-4884-A69B-986B96E68A24}" type="datetime1">
               <a:rPr lang="en-US" smtClean="0"/>
-              <a:t>11/12/2024</a:t>
+              <a:t>11/19/2024</a:t>
             </a:fld>
             <a:endParaRPr lang="en-US"/>
           </a:p>
@@ -3879,7 +3879,7 @@
           <a:p>
             <a:fld id="{50DB7ABA-0172-4F9C-889D-567164F66BCD}" type="datetime1">
               <a:rPr lang="en-US" smtClean="0"/>
-              <a:t>11/12/2024</a:t>
+              <a:t>11/19/2024</a:t>
             </a:fld>
             <a:endParaRPr lang="en-US"/>
           </a:p>
@@ -4170,7 +4170,7 @@
           <a:p>
             <a:fld id="{78AC6A5B-8AE7-4A41-B5A7-9ADC6686DC18}" type="datetime1">
               <a:rPr lang="en-US" smtClean="0"/>
-              <a:t>11/12/2024</a:t>
+              <a:t>11/19/2024</a:t>
             </a:fld>
             <a:endParaRPr lang="en-US"/>
           </a:p>
@@ -4516,7 +4516,7 @@
             <a:fld id="{57E0CF6C-748E-4B7A-BC8B-3011EF78ED13}" type="datetime1">
               <a:rPr lang="en-US" smtClean="0"/>
               <a:pPr/>
-              <a:t>11/12/2024</a:t>
+              <a:t>11/19/2024</a:t>
             </a:fld>
             <a:endParaRPr lang="en-US" dirty="0"/>
           </a:p>
@@ -8731,8 +8731,13 @@
             </a:r>
             <a:r>
               <a:rPr lang="bg-BG" sz="2800" dirty="0"/>
-              <a:t>преобразуване между дати</a:t>
-            </a:r>
+              <a:t>преобразуване </a:t>
+            </a:r>
+            <a:r>
+              <a:rPr lang="bg-BG" sz="2800"/>
+              <a:t>между данни</a:t>
+            </a:r>
+            <a:endParaRPr lang="bg-BG" sz="2800" dirty="0"/>
           </a:p>
           <a:p>
             <a:pPr lvl="3"/>

</xml_diff>